<commit_message>
Fixed code examples that modify source data
</commit_message>
<xml_diff>
--- a/examples/data/tables.pptx
+++ b/examples/data/tables.pptx
@@ -1,6 +1,7 @@
 
 <file path=ppt/presentation.xml><?xml version="1.0" encoding="utf-8"?>
-<p:presentation xmlns:a="http://schemas.openxmlformats.org/drawingml/2006/main" xmlns:r="http://schemas.openxmlformats.org/officeDocument/2006/relationships" xmlns:p="http://schemas.openxmlformats.org/presentationml/2006/main" saveSubsetFonts="1">
+<!--Generated by Aspose.Slides for .NET 19.6-->
+<p:presentation xmlns:r="http://schemas.openxmlformats.org/officeDocument/2006/relationships" xmlns:a="http://schemas.openxmlformats.org/drawingml/2006/main" xmlns:p="http://schemas.openxmlformats.org/presentationml/2006/main" saveSubsetFonts="1">
   <p:sldMasterIdLst>
     <p:sldMasterId id="2147483648" r:id="rId1"/>
   </p:sldMasterIdLst>
@@ -107,19 +108,11 @@
       </a:defRPr>
     </a:lvl9pPr>
   </p:defaultTextStyle>
-  <p:extLst>
-    <p:ext uri="{EFAFB233-063F-42B5-8137-9DF3F51BA10A}">
-      <p15:sldGuideLst xmlns:p15="http://schemas.microsoft.com/office/powerpoint/2012/main"/>
-    </p:ext>
-    <p:ext uri="{2D200454-40CA-4A62-9FC3-DE9A4176ACB9}">
-      <p15:notesGuideLst xmlns:p15="http://schemas.microsoft.com/office/powerpoint/2012/main"/>
-    </p:ext>
-  </p:extLst>
 </p:presentation>
 </file>
 
 <file path=ppt/slideLayouts/slideLayout1.xml><?xml version="1.0" encoding="utf-8"?>
-<p:sldLayout xmlns:a="http://schemas.openxmlformats.org/drawingml/2006/main" xmlns:r="http://schemas.openxmlformats.org/officeDocument/2006/relationships" xmlns:p="http://schemas.openxmlformats.org/presentationml/2006/main" type="title" preserve="1">
+<p:sldLayout xmlns:a="http://schemas.openxmlformats.org/drawingml/2006/main" xmlns:r="http://schemas.openxmlformats.org/officeDocument/2006/relationships" xmlns:p14="http://schemas.microsoft.com/office/powerpoint/2010/main" xmlns:a14="http://schemas.microsoft.com/office/drawing/2010/main" xmlns:p15="http://schemas.microsoft.com/office/powerpoint/2012/main" xmlns:p159="http://schemas.microsoft.com/office/powerpoint/2015/09/main" xmlns:p="http://schemas.openxmlformats.org/presentationml/2006/main" type="title" preserve="1">
   <p:cSld name="Title Slide">
     <p:spTree>
       <p:nvGrpSpPr>
@@ -131,8 +124,6 @@
         <a:xfrm>
           <a:off x="0" y="0"/>
           <a:ext cx="0" cy="0"/>
-          <a:chOff x="0" y="0"/>
-          <a:chExt cx="0" cy="0"/>
         </a:xfrm>
       </p:grpSpPr>
       <p:sp>
@@ -151,9 +142,10 @@
           <a:lstStyle/>
           <a:p>
             <a:r>
-              <a:rPr lang="en-US"/>
+              <a:rPr lang="en-US" smtClean="0"/>
               <a:t>Click to edit Master title style</a:t>
             </a:r>
+            <a:endParaRPr lang="en-US"/>
           </a:p>
         </p:txBody>
       </p:sp>
@@ -264,9 +256,10 @@
           </a:lstStyle>
           <a:p>
             <a:r>
-              <a:rPr lang="en-US"/>
+              <a:rPr lang="en-US" smtClean="0"/>
               <a:t>Click to edit Master subtitle style</a:t>
             </a:r>
+            <a:endParaRPr lang="en-US"/>
           </a:p>
         </p:txBody>
       </p:sp>
@@ -287,7 +280,7 @@
           <a:p>
             <a:fld id="{401A00E4-549F-4626-98C4-745A212C71C5}" type="datetimeFigureOut">
               <a:rPr lang="en-US" smtClean="0"/>
-              <a:t>2/23/2024</a:t>
+              <a:t>11/7/2009</a:t>
             </a:fld>
             <a:endParaRPr lang="en-US"/>
           </a:p>
@@ -341,11 +334,12 @@
     <a:masterClrMapping/>
   </p:clrMapOvr>
   <p:transition/>
+  <p:timing/>
 </p:sldLayout>
 </file>
 
 <file path=ppt/slideLayouts/slideLayout10.xml><?xml version="1.0" encoding="utf-8"?>
-<p:sldLayout xmlns:a="http://schemas.openxmlformats.org/drawingml/2006/main" xmlns:r="http://schemas.openxmlformats.org/officeDocument/2006/relationships" xmlns:p="http://schemas.openxmlformats.org/presentationml/2006/main" type="vertTx" preserve="1">
+<p:sldLayout xmlns:a="http://schemas.openxmlformats.org/drawingml/2006/main" xmlns:r="http://schemas.openxmlformats.org/officeDocument/2006/relationships" xmlns:p14="http://schemas.microsoft.com/office/powerpoint/2010/main" xmlns:a14="http://schemas.microsoft.com/office/drawing/2010/main" xmlns:p15="http://schemas.microsoft.com/office/powerpoint/2012/main" xmlns:p159="http://schemas.microsoft.com/office/powerpoint/2015/09/main" xmlns:p="http://schemas.openxmlformats.org/presentationml/2006/main" type="vertTx" preserve="1">
   <p:cSld name="Title and Vertical Text">
     <p:spTree>
       <p:nvGrpSpPr>
@@ -357,8 +351,6 @@
         <a:xfrm>
           <a:off x="0" y="0"/>
           <a:ext cx="0" cy="0"/>
-          <a:chOff x="0" y="0"/>
-          <a:chExt cx="0" cy="0"/>
         </a:xfrm>
       </p:grpSpPr>
       <p:sp>
@@ -377,9 +369,10 @@
           <a:lstStyle/>
           <a:p>
             <a:r>
-              <a:rPr lang="en-US"/>
+              <a:rPr lang="en-US" smtClean="0"/>
               <a:t>Click to edit Master title style</a:t>
             </a:r>
+            <a:endParaRPr lang="en-US"/>
           </a:p>
         </p:txBody>
       </p:sp>
@@ -399,37 +392,38 @@
           <a:lstStyle/>
           <a:p>
             <a:r>
-              <a:rPr lang="en-US"/>
+              <a:rPr lang="en-US" smtClean="0"/>
               <a:t>Click to edit Master text styles</a:t>
             </a:r>
           </a:p>
           <a:p>
             <a:pPr lvl="1"/>
             <a:r>
-              <a:rPr lang="en-US"/>
+              <a:rPr lang="en-US" smtClean="0"/>
               <a:t>Second level</a:t>
             </a:r>
           </a:p>
           <a:p>
             <a:pPr lvl="2"/>
             <a:r>
-              <a:rPr lang="en-US"/>
+              <a:rPr lang="en-US" smtClean="0"/>
               <a:t>Third level</a:t>
             </a:r>
           </a:p>
           <a:p>
             <a:pPr lvl="3"/>
             <a:r>
-              <a:rPr lang="en-US"/>
+              <a:rPr lang="en-US" smtClean="0"/>
               <a:t>Fourth level</a:t>
             </a:r>
           </a:p>
           <a:p>
             <a:pPr lvl="4"/>
             <a:r>
-              <a:rPr lang="en-US"/>
+              <a:rPr lang="en-US" smtClean="0"/>
               <a:t>Fifth level</a:t>
             </a:r>
+            <a:endParaRPr lang="en-US"/>
           </a:p>
         </p:txBody>
       </p:sp>
@@ -450,7 +444,7 @@
           <a:p>
             <a:fld id="{0758F56F-D36C-4137-9317-F600FD7AC5AE}" type="datetimeFigureOut">
               <a:rPr lang="en-US" smtClean="0"/>
-              <a:t>2/23/2024</a:t>
+              <a:t>11/7/2009</a:t>
             </a:fld>
             <a:endParaRPr lang="en-US"/>
           </a:p>
@@ -504,11 +498,12 @@
     <a:masterClrMapping/>
   </p:clrMapOvr>
   <p:transition/>
+  <p:timing/>
 </p:sldLayout>
 </file>
 
 <file path=ppt/slideLayouts/slideLayout11.xml><?xml version="1.0" encoding="utf-8"?>
-<p:sldLayout xmlns:a="http://schemas.openxmlformats.org/drawingml/2006/main" xmlns:r="http://schemas.openxmlformats.org/officeDocument/2006/relationships" xmlns:p="http://schemas.openxmlformats.org/presentationml/2006/main" type="vertTitleAndTx" preserve="1">
+<p:sldLayout xmlns:a="http://schemas.openxmlformats.org/drawingml/2006/main" xmlns:r="http://schemas.openxmlformats.org/officeDocument/2006/relationships" xmlns:p14="http://schemas.microsoft.com/office/powerpoint/2010/main" xmlns:a14="http://schemas.microsoft.com/office/drawing/2010/main" xmlns:p15="http://schemas.microsoft.com/office/powerpoint/2012/main" xmlns:p159="http://schemas.microsoft.com/office/powerpoint/2015/09/main" xmlns:p="http://schemas.openxmlformats.org/presentationml/2006/main" type="vertTitleAndTx" preserve="1">
   <p:cSld name="Vertical Title and Text">
     <p:spTree>
       <p:nvGrpSpPr>
@@ -520,8 +515,6 @@
         <a:xfrm>
           <a:off x="0" y="0"/>
           <a:ext cx="0" cy="0"/>
-          <a:chOff x="0" y="0"/>
-          <a:chExt cx="0" cy="0"/>
         </a:xfrm>
       </p:grpSpPr>
       <p:sp>
@@ -540,9 +533,10 @@
           <a:lstStyle/>
           <a:p>
             <a:r>
-              <a:rPr lang="en-US"/>
+              <a:rPr lang="en-US" smtClean="0"/>
               <a:t>Click to edit Master title style</a:t>
             </a:r>
+            <a:endParaRPr lang="en-US"/>
           </a:p>
         </p:txBody>
       </p:sp>
@@ -562,37 +556,38 @@
           <a:lstStyle/>
           <a:p>
             <a:r>
-              <a:rPr lang="en-US"/>
+              <a:rPr lang="en-US" smtClean="0"/>
               <a:t>Click to edit Master text styles</a:t>
             </a:r>
           </a:p>
           <a:p>
             <a:pPr lvl="1"/>
             <a:r>
-              <a:rPr lang="en-US"/>
+              <a:rPr lang="en-US" smtClean="0"/>
               <a:t>Second level</a:t>
             </a:r>
           </a:p>
           <a:p>
             <a:pPr lvl="2"/>
             <a:r>
-              <a:rPr lang="en-US"/>
+              <a:rPr lang="en-US" smtClean="0"/>
               <a:t>Third level</a:t>
             </a:r>
           </a:p>
           <a:p>
             <a:pPr lvl="3"/>
             <a:r>
-              <a:rPr lang="en-US"/>
+              <a:rPr lang="en-US" smtClean="0"/>
               <a:t>Fourth level</a:t>
             </a:r>
           </a:p>
           <a:p>
             <a:pPr lvl="4"/>
             <a:r>
-              <a:rPr lang="en-US"/>
+              <a:rPr lang="en-US" smtClean="0"/>
               <a:t>Fifth level</a:t>
             </a:r>
+            <a:endParaRPr lang="en-US"/>
           </a:p>
         </p:txBody>
       </p:sp>
@@ -613,7 +608,7 @@
           <a:p>
             <a:fld id="{C3D995DA-A67E-461D-92E7-437886C810B2}" type="datetimeFigureOut">
               <a:rPr lang="en-US" smtClean="0"/>
-              <a:t>2/23/2024</a:t>
+              <a:t>11/7/2009</a:t>
             </a:fld>
             <a:endParaRPr lang="en-US"/>
           </a:p>
@@ -667,11 +662,12 @@
     <a:masterClrMapping/>
   </p:clrMapOvr>
   <p:transition/>
+  <p:timing/>
 </p:sldLayout>
 </file>
 
 <file path=ppt/slideLayouts/slideLayout2.xml><?xml version="1.0" encoding="utf-8"?>
-<p:sldLayout xmlns:a="http://schemas.openxmlformats.org/drawingml/2006/main" xmlns:r="http://schemas.openxmlformats.org/officeDocument/2006/relationships" xmlns:p="http://schemas.openxmlformats.org/presentationml/2006/main" type="obj" preserve="1">
+<p:sldLayout xmlns:a="http://schemas.openxmlformats.org/drawingml/2006/main" xmlns:r="http://schemas.openxmlformats.org/officeDocument/2006/relationships" xmlns:p14="http://schemas.microsoft.com/office/powerpoint/2010/main" xmlns:a14="http://schemas.microsoft.com/office/drawing/2010/main" xmlns:p15="http://schemas.microsoft.com/office/powerpoint/2012/main" xmlns:p159="http://schemas.microsoft.com/office/powerpoint/2015/09/main" xmlns:p="http://schemas.openxmlformats.org/presentationml/2006/main" type="obj" preserve="1">
   <p:cSld name="Title and Content">
     <p:spTree>
       <p:nvGrpSpPr>
@@ -683,8 +679,6 @@
         <a:xfrm>
           <a:off x="0" y="0"/>
           <a:ext cx="0" cy="0"/>
-          <a:chOff x="0" y="0"/>
-          <a:chExt cx="0" cy="0"/>
         </a:xfrm>
       </p:grpSpPr>
       <p:sp>
@@ -703,9 +697,10 @@
           <a:lstStyle/>
           <a:p>
             <a:r>
-              <a:rPr lang="en-US"/>
+              <a:rPr lang="en-US" smtClean="0"/>
               <a:t>Click to edit Master title style</a:t>
             </a:r>
+            <a:endParaRPr lang="en-US"/>
           </a:p>
         </p:txBody>
       </p:sp>
@@ -725,37 +720,38 @@
           <a:lstStyle/>
           <a:p>
             <a:r>
-              <a:rPr lang="en-US"/>
+              <a:rPr lang="en-US" smtClean="0"/>
               <a:t>Click to edit Master text styles</a:t>
             </a:r>
           </a:p>
           <a:p>
             <a:pPr lvl="1"/>
             <a:r>
-              <a:rPr lang="en-US"/>
+              <a:rPr lang="en-US" smtClean="0"/>
               <a:t>Second level</a:t>
             </a:r>
           </a:p>
           <a:p>
             <a:pPr lvl="2"/>
             <a:r>
-              <a:rPr lang="en-US"/>
+              <a:rPr lang="en-US" smtClean="0"/>
               <a:t>Third level</a:t>
             </a:r>
           </a:p>
           <a:p>
             <a:pPr lvl="3"/>
             <a:r>
-              <a:rPr lang="en-US"/>
+              <a:rPr lang="en-US" smtClean="0"/>
               <a:t>Fourth level</a:t>
             </a:r>
           </a:p>
           <a:p>
             <a:pPr lvl="4"/>
             <a:r>
-              <a:rPr lang="en-US"/>
+              <a:rPr lang="en-US" smtClean="0"/>
               <a:t>Fifth level</a:t>
             </a:r>
+            <a:endParaRPr lang="en-US"/>
           </a:p>
         </p:txBody>
       </p:sp>
@@ -776,7 +772,7 @@
           <a:p>
             <a:fld id="{DF147E31-E0BE-4FD0-8740-1DF1DE7C8B9E}" type="datetimeFigureOut">
               <a:rPr lang="en-US" smtClean="0"/>
-              <a:t>2/23/2024</a:t>
+              <a:t>11/7/2009</a:t>
             </a:fld>
             <a:endParaRPr lang="en-US"/>
           </a:p>
@@ -830,11 +826,12 @@
     <a:masterClrMapping/>
   </p:clrMapOvr>
   <p:transition/>
+  <p:timing/>
 </p:sldLayout>
 </file>
 
 <file path=ppt/slideLayouts/slideLayout3.xml><?xml version="1.0" encoding="utf-8"?>
-<p:sldLayout xmlns:a="http://schemas.openxmlformats.org/drawingml/2006/main" xmlns:r="http://schemas.openxmlformats.org/officeDocument/2006/relationships" xmlns:p="http://schemas.openxmlformats.org/presentationml/2006/main" type="secHead" preserve="1">
+<p:sldLayout xmlns:a="http://schemas.openxmlformats.org/drawingml/2006/main" xmlns:r="http://schemas.openxmlformats.org/officeDocument/2006/relationships" xmlns:p14="http://schemas.microsoft.com/office/powerpoint/2010/main" xmlns:a14="http://schemas.microsoft.com/office/drawing/2010/main" xmlns:p15="http://schemas.microsoft.com/office/powerpoint/2012/main" xmlns:p159="http://schemas.microsoft.com/office/powerpoint/2015/09/main" xmlns:p="http://schemas.openxmlformats.org/presentationml/2006/main" type="secHead" preserve="1">
   <p:cSld name="Section Header">
     <p:spTree>
       <p:nvGrpSpPr>
@@ -846,8 +843,6 @@
         <a:xfrm>
           <a:off x="0" y="0"/>
           <a:ext cx="0" cy="0"/>
-          <a:chOff x="0" y="0"/>
-          <a:chExt cx="0" cy="0"/>
         </a:xfrm>
       </p:grpSpPr>
       <p:sp>
@@ -870,9 +865,10 @@
           </a:lstStyle>
           <a:p>
             <a:r>
-              <a:rPr lang="en-US"/>
+              <a:rPr lang="en-US" smtClean="0"/>
               <a:t>Click to edit Master title style</a:t>
             </a:r>
+            <a:endParaRPr lang="en-US"/>
           </a:p>
         </p:txBody>
       </p:sp>
@@ -983,7 +979,7 @@
           </a:lstStyle>
           <a:p>
             <a:r>
-              <a:rPr lang="en-US"/>
+              <a:rPr lang="en-US" smtClean="0"/>
               <a:t>Click to edit Master text styles</a:t>
             </a:r>
           </a:p>
@@ -1006,7 +1002,7 @@
           <a:p>
             <a:fld id="{878FBD81-27D4-4140-A3F5-569056BFB9D4}" type="datetimeFigureOut">
               <a:rPr lang="en-US" smtClean="0"/>
-              <a:t>2/23/2024</a:t>
+              <a:t>11/7/2009</a:t>
             </a:fld>
             <a:endParaRPr lang="en-US"/>
           </a:p>
@@ -1060,11 +1056,12 @@
     <a:masterClrMapping/>
   </p:clrMapOvr>
   <p:transition/>
+  <p:timing/>
 </p:sldLayout>
 </file>
 
 <file path=ppt/slideLayouts/slideLayout4.xml><?xml version="1.0" encoding="utf-8"?>
-<p:sldLayout xmlns:a="http://schemas.openxmlformats.org/drawingml/2006/main" xmlns:r="http://schemas.openxmlformats.org/officeDocument/2006/relationships" xmlns:p="http://schemas.openxmlformats.org/presentationml/2006/main" type="twoObj" preserve="1">
+<p:sldLayout xmlns:a="http://schemas.openxmlformats.org/drawingml/2006/main" xmlns:r="http://schemas.openxmlformats.org/officeDocument/2006/relationships" xmlns:p14="http://schemas.microsoft.com/office/powerpoint/2010/main" xmlns:a14="http://schemas.microsoft.com/office/drawing/2010/main" xmlns:p15="http://schemas.microsoft.com/office/powerpoint/2012/main" xmlns:p159="http://schemas.microsoft.com/office/powerpoint/2015/09/main" xmlns:p="http://schemas.openxmlformats.org/presentationml/2006/main" type="twoObj" preserve="1">
   <p:cSld name="Two Content">
     <p:spTree>
       <p:nvGrpSpPr>
@@ -1076,8 +1073,6 @@
         <a:xfrm>
           <a:off x="0" y="0"/>
           <a:ext cx="0" cy="0"/>
-          <a:chOff x="0" y="0"/>
-          <a:chExt cx="0" cy="0"/>
         </a:xfrm>
       </p:grpSpPr>
       <p:sp>
@@ -1096,9 +1091,10 @@
           <a:lstStyle/>
           <a:p>
             <a:r>
-              <a:rPr lang="en-US"/>
+              <a:rPr lang="en-US" smtClean="0"/>
               <a:t>Click to edit Master title style</a:t>
             </a:r>
+            <a:endParaRPr lang="en-US"/>
           </a:p>
         </p:txBody>
       </p:sp>
@@ -1146,37 +1142,38 @@
           </a:lstStyle>
           <a:p>
             <a:r>
-              <a:rPr lang="en-US"/>
+              <a:rPr lang="en-US" smtClean="0"/>
               <a:t>Click to edit Master text styles</a:t>
             </a:r>
           </a:p>
           <a:p>
             <a:pPr lvl="1"/>
             <a:r>
-              <a:rPr lang="en-US"/>
+              <a:rPr lang="en-US" smtClean="0"/>
               <a:t>Second level</a:t>
             </a:r>
           </a:p>
           <a:p>
             <a:pPr lvl="2"/>
             <a:r>
-              <a:rPr lang="en-US"/>
+              <a:rPr lang="en-US" smtClean="0"/>
               <a:t>Third level</a:t>
             </a:r>
           </a:p>
           <a:p>
             <a:pPr lvl="3"/>
             <a:r>
-              <a:rPr lang="en-US"/>
+              <a:rPr lang="en-US" smtClean="0"/>
               <a:t>Fourth level</a:t>
             </a:r>
           </a:p>
           <a:p>
             <a:pPr lvl="4"/>
             <a:r>
-              <a:rPr lang="en-US"/>
+              <a:rPr lang="en-US" smtClean="0"/>
               <a:t>Fifth level</a:t>
             </a:r>
+            <a:endParaRPr lang="en-US"/>
           </a:p>
         </p:txBody>
       </p:sp>
@@ -1224,37 +1221,38 @@
           </a:lstStyle>
           <a:p>
             <a:r>
-              <a:rPr lang="en-US"/>
+              <a:rPr lang="en-US" smtClean="0"/>
               <a:t>Click to edit Master text styles</a:t>
             </a:r>
           </a:p>
           <a:p>
             <a:pPr lvl="1"/>
             <a:r>
-              <a:rPr lang="en-US"/>
+              <a:rPr lang="en-US" smtClean="0"/>
               <a:t>Second level</a:t>
             </a:r>
           </a:p>
           <a:p>
             <a:pPr lvl="2"/>
             <a:r>
-              <a:rPr lang="en-US"/>
+              <a:rPr lang="en-US" smtClean="0"/>
               <a:t>Third level</a:t>
             </a:r>
           </a:p>
           <a:p>
             <a:pPr lvl="3"/>
             <a:r>
-              <a:rPr lang="en-US"/>
+              <a:rPr lang="en-US" smtClean="0"/>
               <a:t>Fourth level</a:t>
             </a:r>
           </a:p>
           <a:p>
             <a:pPr lvl="4"/>
             <a:r>
-              <a:rPr lang="en-US"/>
+              <a:rPr lang="en-US" smtClean="0"/>
               <a:t>Fifth level</a:t>
             </a:r>
+            <a:endParaRPr lang="en-US"/>
           </a:p>
         </p:txBody>
       </p:sp>
@@ -1275,7 +1273,7 @@
           <a:p>
             <a:fld id="{53DE58B3-0E2A-42CF-9289-61E238B49D32}" type="datetimeFigureOut">
               <a:rPr lang="en-US" smtClean="0"/>
-              <a:t>2/23/2024</a:t>
+              <a:t>11/7/2009</a:t>
             </a:fld>
             <a:endParaRPr lang="en-US"/>
           </a:p>
@@ -1329,11 +1327,12 @@
     <a:masterClrMapping/>
   </p:clrMapOvr>
   <p:transition/>
+  <p:timing/>
 </p:sldLayout>
 </file>
 
 <file path=ppt/slideLayouts/slideLayout5.xml><?xml version="1.0" encoding="utf-8"?>
-<p:sldLayout xmlns:a="http://schemas.openxmlformats.org/drawingml/2006/main" xmlns:r="http://schemas.openxmlformats.org/officeDocument/2006/relationships" xmlns:p="http://schemas.openxmlformats.org/presentationml/2006/main" type="twoTxTwoObj" preserve="1">
+<p:sldLayout xmlns:a="http://schemas.openxmlformats.org/drawingml/2006/main" xmlns:r="http://schemas.openxmlformats.org/officeDocument/2006/relationships" xmlns:p14="http://schemas.microsoft.com/office/powerpoint/2010/main" xmlns:a14="http://schemas.microsoft.com/office/drawing/2010/main" xmlns:p15="http://schemas.microsoft.com/office/powerpoint/2012/main" xmlns:p159="http://schemas.microsoft.com/office/powerpoint/2015/09/main" xmlns:p="http://schemas.openxmlformats.org/presentationml/2006/main" type="twoTxTwoObj" preserve="1">
   <p:cSld name="Comparison">
     <p:spTree>
       <p:nvGrpSpPr>
@@ -1345,8 +1344,6 @@
         <a:xfrm>
           <a:off x="0" y="0"/>
           <a:ext cx="0" cy="0"/>
-          <a:chOff x="0" y="0"/>
-          <a:chExt cx="0" cy="0"/>
         </a:xfrm>
       </p:grpSpPr>
       <p:sp>
@@ -1365,9 +1362,10 @@
           <a:lstStyle/>
           <a:p>
             <a:r>
-              <a:rPr lang="en-US"/>
+              <a:rPr lang="en-US" smtClean="0"/>
               <a:t>Click to edit Master title style</a:t>
             </a:r>
+            <a:endParaRPr lang="en-US"/>
           </a:p>
         </p:txBody>
       </p:sp>
@@ -1424,7 +1422,7 @@
           </a:lstStyle>
           <a:p>
             <a:r>
-              <a:rPr lang="en-US"/>
+              <a:rPr lang="en-US" smtClean="0"/>
               <a:t>Click to edit Master text styles</a:t>
             </a:r>
           </a:p>
@@ -1474,37 +1472,38 @@
           </a:lstStyle>
           <a:p>
             <a:r>
-              <a:rPr lang="en-US"/>
+              <a:rPr lang="en-US" smtClean="0"/>
               <a:t>Click to edit Master text styles</a:t>
             </a:r>
           </a:p>
           <a:p>
             <a:pPr lvl="1"/>
             <a:r>
-              <a:rPr lang="en-US"/>
+              <a:rPr lang="en-US" smtClean="0"/>
               <a:t>Second level</a:t>
             </a:r>
           </a:p>
           <a:p>
             <a:pPr lvl="2"/>
             <a:r>
-              <a:rPr lang="en-US"/>
+              <a:rPr lang="en-US" smtClean="0"/>
               <a:t>Third level</a:t>
             </a:r>
           </a:p>
           <a:p>
             <a:pPr lvl="3"/>
             <a:r>
-              <a:rPr lang="en-US"/>
+              <a:rPr lang="en-US" smtClean="0"/>
               <a:t>Fourth level</a:t>
             </a:r>
           </a:p>
           <a:p>
             <a:pPr lvl="4"/>
             <a:r>
-              <a:rPr lang="en-US"/>
+              <a:rPr lang="en-US" smtClean="0"/>
               <a:t>Fifth level</a:t>
             </a:r>
+            <a:endParaRPr lang="en-US"/>
           </a:p>
         </p:txBody>
       </p:sp>
@@ -1561,7 +1560,7 @@
           </a:lstStyle>
           <a:p>
             <a:r>
-              <a:rPr lang="en-US"/>
+              <a:rPr lang="en-US" smtClean="0"/>
               <a:t>Click to edit Master text styles</a:t>
             </a:r>
           </a:p>
@@ -1611,37 +1610,38 @@
           </a:lstStyle>
           <a:p>
             <a:r>
-              <a:rPr lang="en-US"/>
+              <a:rPr lang="en-US" smtClean="0"/>
               <a:t>Click to edit Master text styles</a:t>
             </a:r>
           </a:p>
           <a:p>
             <a:pPr lvl="1"/>
             <a:r>
-              <a:rPr lang="en-US"/>
+              <a:rPr lang="en-US" smtClean="0"/>
               <a:t>Second level</a:t>
             </a:r>
           </a:p>
           <a:p>
             <a:pPr lvl="2"/>
             <a:r>
-              <a:rPr lang="en-US"/>
+              <a:rPr lang="en-US" smtClean="0"/>
               <a:t>Third level</a:t>
             </a:r>
           </a:p>
           <a:p>
             <a:pPr lvl="3"/>
             <a:r>
-              <a:rPr lang="en-US"/>
+              <a:rPr lang="en-US" smtClean="0"/>
               <a:t>Fourth level</a:t>
             </a:r>
           </a:p>
           <a:p>
             <a:pPr lvl="4"/>
             <a:r>
-              <a:rPr lang="en-US"/>
+              <a:rPr lang="en-US" smtClean="0"/>
               <a:t>Fifth level</a:t>
             </a:r>
+            <a:endParaRPr lang="en-US"/>
           </a:p>
         </p:txBody>
       </p:sp>
@@ -1662,7 +1662,7 @@
           <a:p>
             <a:fld id="{CFFA16F8-C309-4ACC-AA21-796FE9AA7EBB}" type="datetimeFigureOut">
               <a:rPr lang="en-US" smtClean="0"/>
-              <a:t>2/23/2024</a:t>
+              <a:t>11/7/2009</a:t>
             </a:fld>
             <a:endParaRPr lang="en-US"/>
           </a:p>
@@ -1716,11 +1716,12 @@
     <a:masterClrMapping/>
   </p:clrMapOvr>
   <p:transition/>
+  <p:timing/>
 </p:sldLayout>
 </file>
 
 <file path=ppt/slideLayouts/slideLayout6.xml><?xml version="1.0" encoding="utf-8"?>
-<p:sldLayout xmlns:a="http://schemas.openxmlformats.org/drawingml/2006/main" xmlns:r="http://schemas.openxmlformats.org/officeDocument/2006/relationships" xmlns:p="http://schemas.openxmlformats.org/presentationml/2006/main" type="titleOnly" preserve="1">
+<p:sldLayout xmlns:a="http://schemas.openxmlformats.org/drawingml/2006/main" xmlns:r="http://schemas.openxmlformats.org/officeDocument/2006/relationships" xmlns:p14="http://schemas.microsoft.com/office/powerpoint/2010/main" xmlns:a14="http://schemas.microsoft.com/office/drawing/2010/main" xmlns:p15="http://schemas.microsoft.com/office/powerpoint/2012/main" xmlns:p159="http://schemas.microsoft.com/office/powerpoint/2015/09/main" xmlns:p="http://schemas.openxmlformats.org/presentationml/2006/main" type="titleOnly" preserve="1">
   <p:cSld name="Title Only">
     <p:spTree>
       <p:nvGrpSpPr>
@@ -1732,8 +1733,6 @@
         <a:xfrm>
           <a:off x="0" y="0"/>
           <a:ext cx="0" cy="0"/>
-          <a:chOff x="0" y="0"/>
-          <a:chExt cx="0" cy="0"/>
         </a:xfrm>
       </p:grpSpPr>
       <p:sp>
@@ -1752,9 +1751,10 @@
           <a:lstStyle/>
           <a:p>
             <a:r>
-              <a:rPr lang="en-US"/>
+              <a:rPr lang="en-US" smtClean="0"/>
               <a:t>Click to edit Master title style</a:t>
             </a:r>
+            <a:endParaRPr lang="en-US"/>
           </a:p>
         </p:txBody>
       </p:sp>
@@ -1775,7 +1775,7 @@
           <a:p>
             <a:fld id="{4963F922-A77F-49C4-A907-DB95DC7184FA}" type="datetimeFigureOut">
               <a:rPr lang="en-US" smtClean="0"/>
-              <a:t>2/23/2024</a:t>
+              <a:t>11/7/2009</a:t>
             </a:fld>
             <a:endParaRPr lang="en-US"/>
           </a:p>
@@ -1829,11 +1829,12 @@
     <a:masterClrMapping/>
   </p:clrMapOvr>
   <p:transition/>
+  <p:timing/>
 </p:sldLayout>
 </file>
 
 <file path=ppt/slideLayouts/slideLayout7.xml><?xml version="1.0" encoding="utf-8"?>
-<p:sldLayout xmlns:a="http://schemas.openxmlformats.org/drawingml/2006/main" xmlns:r="http://schemas.openxmlformats.org/officeDocument/2006/relationships" xmlns:p="http://schemas.openxmlformats.org/presentationml/2006/main" type="blank" preserve="1">
+<p:sldLayout xmlns:a="http://schemas.openxmlformats.org/drawingml/2006/main" xmlns:r="http://schemas.openxmlformats.org/officeDocument/2006/relationships" xmlns:p14="http://schemas.microsoft.com/office/powerpoint/2010/main" xmlns:a14="http://schemas.microsoft.com/office/drawing/2010/main" xmlns:p15="http://schemas.microsoft.com/office/powerpoint/2012/main" xmlns:p159="http://schemas.microsoft.com/office/powerpoint/2015/09/main" xmlns:p="http://schemas.openxmlformats.org/presentationml/2006/main" type="blank" preserve="1">
   <p:cSld name="Blank">
     <p:spTree>
       <p:nvGrpSpPr>
@@ -1845,8 +1846,6 @@
         <a:xfrm>
           <a:off x="0" y="0"/>
           <a:ext cx="0" cy="0"/>
-          <a:chOff x="0" y="0"/>
-          <a:chExt cx="0" cy="0"/>
         </a:xfrm>
       </p:grpSpPr>
       <p:sp>
@@ -1866,7 +1865,7 @@
           <a:p>
             <a:fld id="{1A921B36-9F9A-4EB3-A7D9-5E1C3C832D69}" type="datetimeFigureOut">
               <a:rPr lang="en-US" smtClean="0"/>
-              <a:t>2/23/2024</a:t>
+              <a:t>11/7/2009</a:t>
             </a:fld>
             <a:endParaRPr lang="en-US"/>
           </a:p>
@@ -1920,11 +1919,12 @@
     <a:masterClrMapping/>
   </p:clrMapOvr>
   <p:transition/>
+  <p:timing/>
 </p:sldLayout>
 </file>
 
 <file path=ppt/slideLayouts/slideLayout8.xml><?xml version="1.0" encoding="utf-8"?>
-<p:sldLayout xmlns:a="http://schemas.openxmlformats.org/drawingml/2006/main" xmlns:r="http://schemas.openxmlformats.org/officeDocument/2006/relationships" xmlns:p="http://schemas.openxmlformats.org/presentationml/2006/main" type="objTx" preserve="1">
+<p:sldLayout xmlns:a="http://schemas.openxmlformats.org/drawingml/2006/main" xmlns:r="http://schemas.openxmlformats.org/officeDocument/2006/relationships" xmlns:p14="http://schemas.microsoft.com/office/powerpoint/2010/main" xmlns:a14="http://schemas.microsoft.com/office/drawing/2010/main" xmlns:p15="http://schemas.microsoft.com/office/powerpoint/2012/main" xmlns:p159="http://schemas.microsoft.com/office/powerpoint/2015/09/main" xmlns:p="http://schemas.openxmlformats.org/presentationml/2006/main" type="objTx" preserve="1">
   <p:cSld name="Content with Caption">
     <p:spTree>
       <p:nvGrpSpPr>
@@ -1936,8 +1936,6 @@
         <a:xfrm>
           <a:off x="0" y="0"/>
           <a:ext cx="0" cy="0"/>
-          <a:chOff x="0" y="0"/>
-          <a:chExt cx="0" cy="0"/>
         </a:xfrm>
       </p:grpSpPr>
       <p:sp>
@@ -1960,9 +1958,10 @@
           </a:lstStyle>
           <a:p>
             <a:r>
-              <a:rPr lang="en-US"/>
+              <a:rPr lang="en-US" smtClean="0"/>
               <a:t>Click to edit Master title style</a:t>
             </a:r>
+            <a:endParaRPr lang="en-US"/>
           </a:p>
         </p:txBody>
       </p:sp>
@@ -2010,37 +2009,38 @@
           </a:lstStyle>
           <a:p>
             <a:r>
-              <a:rPr lang="en-US"/>
+              <a:rPr lang="en-US" smtClean="0"/>
               <a:t>Click to edit Master text styles</a:t>
             </a:r>
           </a:p>
           <a:p>
             <a:pPr lvl="1"/>
             <a:r>
-              <a:rPr lang="en-US"/>
+              <a:rPr lang="en-US" smtClean="0"/>
               <a:t>Second level</a:t>
             </a:r>
           </a:p>
           <a:p>
             <a:pPr lvl="2"/>
             <a:r>
-              <a:rPr lang="en-US"/>
+              <a:rPr lang="en-US" smtClean="0"/>
               <a:t>Third level</a:t>
             </a:r>
           </a:p>
           <a:p>
             <a:pPr lvl="3"/>
             <a:r>
-              <a:rPr lang="en-US"/>
+              <a:rPr lang="en-US" smtClean="0"/>
               <a:t>Fourth level</a:t>
             </a:r>
           </a:p>
           <a:p>
             <a:pPr lvl="4"/>
             <a:r>
-              <a:rPr lang="en-US"/>
+              <a:rPr lang="en-US" smtClean="0"/>
               <a:t>Fifth level</a:t>
             </a:r>
+            <a:endParaRPr lang="en-US"/>
           </a:p>
         </p:txBody>
       </p:sp>
@@ -2097,7 +2097,7 @@
           </a:lstStyle>
           <a:p>
             <a:r>
-              <a:rPr lang="en-US"/>
+              <a:rPr lang="en-US" smtClean="0"/>
               <a:t>Click to edit Master text styles</a:t>
             </a:r>
           </a:p>
@@ -2120,7 +2120,7 @@
           <a:p>
             <a:fld id="{9E1C4B88-BF8A-48BB-9497-6DDE972AD94E}" type="datetimeFigureOut">
               <a:rPr lang="en-US" smtClean="0"/>
-              <a:t>2/23/2024</a:t>
+              <a:t>11/7/2009</a:t>
             </a:fld>
             <a:endParaRPr lang="en-US"/>
           </a:p>
@@ -2174,11 +2174,12 @@
     <a:masterClrMapping/>
   </p:clrMapOvr>
   <p:transition/>
+  <p:timing/>
 </p:sldLayout>
 </file>
 
 <file path=ppt/slideLayouts/slideLayout9.xml><?xml version="1.0" encoding="utf-8"?>
-<p:sldLayout xmlns:a="http://schemas.openxmlformats.org/drawingml/2006/main" xmlns:r="http://schemas.openxmlformats.org/officeDocument/2006/relationships" xmlns:p="http://schemas.openxmlformats.org/presentationml/2006/main" type="picTx" preserve="1">
+<p:sldLayout xmlns:a="http://schemas.openxmlformats.org/drawingml/2006/main" xmlns:r="http://schemas.openxmlformats.org/officeDocument/2006/relationships" xmlns:p14="http://schemas.microsoft.com/office/powerpoint/2010/main" xmlns:a14="http://schemas.microsoft.com/office/drawing/2010/main" xmlns:p15="http://schemas.microsoft.com/office/powerpoint/2012/main" xmlns:p159="http://schemas.microsoft.com/office/powerpoint/2015/09/main" xmlns:p="http://schemas.openxmlformats.org/presentationml/2006/main" type="picTx" preserve="1">
   <p:cSld name="Picture with Caption">
     <p:spTree>
       <p:nvGrpSpPr>
@@ -2190,8 +2191,6 @@
         <a:xfrm>
           <a:off x="0" y="0"/>
           <a:ext cx="0" cy="0"/>
-          <a:chOff x="0" y="0"/>
-          <a:chExt cx="0" cy="0"/>
         </a:xfrm>
       </p:grpSpPr>
       <p:sp>
@@ -2214,9 +2213,10 @@
           </a:lstStyle>
           <a:p>
             <a:r>
-              <a:rPr lang="en-US"/>
+              <a:rPr lang="en-US" smtClean="0"/>
               <a:t>Click to edit Master title style</a:t>
             </a:r>
+            <a:endParaRPr lang="en-US"/>
           </a:p>
         </p:txBody>
       </p:sp>
@@ -2329,7 +2329,7 @@
           </a:lstStyle>
           <a:p>
             <a:r>
-              <a:rPr lang="en-US"/>
+              <a:rPr lang="en-US" smtClean="0"/>
               <a:t>Click to edit Master text styles</a:t>
             </a:r>
           </a:p>
@@ -2352,7 +2352,7 @@
           <a:p>
             <a:fld id="{011A7994-4F6B-4425-8A67-8F375BF1A960}" type="datetimeFigureOut">
               <a:rPr lang="en-US" smtClean="0"/>
-              <a:t>2/23/2024</a:t>
+              <a:t>11/7/2009</a:t>
             </a:fld>
             <a:endParaRPr lang="en-US"/>
           </a:p>
@@ -2406,11 +2406,12 @@
     <a:masterClrMapping/>
   </p:clrMapOvr>
   <p:transition/>
+  <p:timing/>
 </p:sldLayout>
 </file>
 
 <file path=ppt/slideMasters/slideMaster1.xml><?xml version="1.0" encoding="utf-8"?>
-<p:sldMaster xmlns:a="http://schemas.openxmlformats.org/drawingml/2006/main" xmlns:r="http://schemas.openxmlformats.org/officeDocument/2006/relationships" xmlns:p="http://schemas.openxmlformats.org/presentationml/2006/main">
+<p:sldMaster xmlns:a="http://schemas.openxmlformats.org/drawingml/2006/main" xmlns:r="http://schemas.openxmlformats.org/officeDocument/2006/relationships" xmlns:p14="http://schemas.microsoft.com/office/powerpoint/2010/main" xmlns:a14="http://schemas.microsoft.com/office/drawing/2010/main" xmlns:p15="http://schemas.microsoft.com/office/powerpoint/2012/main" xmlns:p159="http://schemas.microsoft.com/office/powerpoint/2015/09/main" xmlns:p="http://schemas.openxmlformats.org/presentationml/2006/main">
   <p:cSld>
     <p:bg>
       <p:bgRef idx="1001">
@@ -2427,8 +2428,6 @@
         <a:xfrm>
           <a:off x="0" y="0"/>
           <a:ext cx="0" cy="0"/>
-          <a:chOff x="0" y="0"/>
-          <a:chExt cx="0" cy="0"/>
         </a:xfrm>
       </p:grpSpPr>
       <p:sp>
@@ -2457,9 +2456,10 @@
           <a:lstStyle/>
           <a:p>
             <a:r>
-              <a:rPr lang="en-US"/>
+              <a:rPr lang="en-US" smtClean="0"/>
               <a:t>Click to edit Master title style</a:t>
             </a:r>
+            <a:endParaRPr lang="en-US"/>
           </a:p>
         </p:txBody>
       </p:sp>
@@ -2489,37 +2489,38 @@
           <a:lstStyle/>
           <a:p>
             <a:r>
-              <a:rPr lang="en-US"/>
+              <a:rPr lang="en-US" smtClean="0"/>
               <a:t>Click to edit Master text styles</a:t>
             </a:r>
           </a:p>
           <a:p>
             <a:pPr lvl="1"/>
             <a:r>
-              <a:rPr lang="en-US"/>
+              <a:rPr lang="en-US" smtClean="0"/>
               <a:t>Second level</a:t>
             </a:r>
           </a:p>
           <a:p>
             <a:pPr lvl="2"/>
             <a:r>
-              <a:rPr lang="en-US"/>
+              <a:rPr lang="en-US" smtClean="0"/>
               <a:t>Third level</a:t>
             </a:r>
           </a:p>
           <a:p>
             <a:pPr lvl="3"/>
             <a:r>
-              <a:rPr lang="en-US"/>
+              <a:rPr lang="en-US" smtClean="0"/>
               <a:t>Fourth level</a:t>
             </a:r>
           </a:p>
           <a:p>
             <a:pPr lvl="4"/>
             <a:r>
-              <a:rPr lang="en-US"/>
+              <a:rPr lang="en-US" smtClean="0"/>
               <a:t>Fifth level</a:t>
             </a:r>
+            <a:endParaRPr lang="en-US"/>
           </a:p>
         </p:txBody>
       </p:sp>
@@ -2558,7 +2559,7 @@
           <a:p>
             <a:fld id="{E8FD0B7A-F5DD-4F40-B4CB-3B2C354B893A}" type="datetimeFigureOut">
               <a:rPr lang="en-US" smtClean="0"/>
-              <a:t>2/23/2024</a:t>
+              <a:t>11/7/2009</a:t>
             </a:fld>
             <a:endParaRPr lang="en-US"/>
           </a:p>
@@ -2659,6 +2660,7 @@
     <p:sldLayoutId id="2147483659" r:id="rId11"/>
   </p:sldLayoutIdLst>
   <p:transition/>
+  <p:timing/>
   <p:txStyles>
     <p:titleStyle>
       <a:lvl1pPr algn="ctr" defTabSz="914400" rtl="0" eaLnBrk="1" latinLnBrk="0" hangingPunct="1">
@@ -2913,8 +2915,8 @@
 </file>
 
 <file path=ppt/slides/slide1.xml><?xml version="1.0" encoding="utf-8"?>
-<p:sld xmlns:a="http://schemas.openxmlformats.org/drawingml/2006/main" xmlns:r="http://schemas.openxmlformats.org/officeDocument/2006/relationships" xmlns:p="http://schemas.openxmlformats.org/presentationml/2006/main">
-  <p:cSld>
+<p:sld xmlns:a="http://schemas.openxmlformats.org/drawingml/2006/main" xmlns:r="http://schemas.openxmlformats.org/officeDocument/2006/relationships" xmlns:p14="http://schemas.microsoft.com/office/powerpoint/2010/main" xmlns:a14="http://schemas.microsoft.com/office/drawing/2010/main" xmlns:p15="http://schemas.microsoft.com/office/powerpoint/2012/main" xmlns:p159="http://schemas.microsoft.com/office/powerpoint/2015/09/main" xmlns:p="http://schemas.openxmlformats.org/presentationml/2006/main">
+  <p:cSld name="">
     <p:spTree>
       <p:nvGrpSpPr>
         <p:cNvPr id="1" name=""/>
@@ -2925,8 +2927,6 @@
         <a:xfrm>
           <a:off x="0" y="0"/>
           <a:ext cx="0" cy="0"/>
-          <a:chOff x="0" y="0"/>
-          <a:chExt cx="0" cy="0"/>
         </a:xfrm>
       </p:grpSpPr>
       <p:graphicFrame>
@@ -2935,13 +2935,7 @@
           <p:cNvGraphicFramePr>
             <a:graphicFrameLocks noGrp="1"/>
           </p:cNvGraphicFramePr>
-          <p:nvPr>
-            <p:extLst>
-              <p:ext uri="{D42A27DB-BD31-4B8C-83A1-F6EECF244321}">
-                <p14:modId xmlns:p14="http://schemas.microsoft.com/office/powerpoint/2010/main" val="2779267332"/>
-              </p:ext>
-            </p:extLst>
-          </p:nvPr>
+          <p:nvPr/>
         </p:nvGraphicFramePr>
         <p:xfrm>
           <a:off x="1270000" y="635000"/>
@@ -2950,47 +2944,21 @@
         <a:graphic>
           <a:graphicData uri="http://schemas.openxmlformats.org/drawingml/2006/table">
             <a:tbl>
-              <a:tblPr bandRow="1">
+              <a:tblPr firstRow="1" bandRow="1">
                 <a:tableStyleId>{5C22544A-7EE6-4342-B048-85BDC9FD1C3A}</a:tableStyleId>
               </a:tblPr>
               <a:tblGrid>
-                <a:gridCol w="635000">
-                  <a:extLst>
-                    <a:ext uri="{9D8B030D-6E8A-4147-A177-3AD203B41FA5}">
-                      <a16:colId xmlns:a16="http://schemas.microsoft.com/office/drawing/2014/main" val="20000"/>
-                    </a:ext>
-                  </a:extLst>
-                </a:gridCol>
-                <a:gridCol w="635000">
-                  <a:extLst>
-                    <a:ext uri="{9D8B030D-6E8A-4147-A177-3AD203B41FA5}">
-                      <a16:colId xmlns:a16="http://schemas.microsoft.com/office/drawing/2014/main" val="20001"/>
-                    </a:ext>
-                  </a:extLst>
-                </a:gridCol>
-                <a:gridCol w="635000">
-                  <a:extLst>
-                    <a:ext uri="{9D8B030D-6E8A-4147-A177-3AD203B41FA5}">
-                      <a16:colId xmlns:a16="http://schemas.microsoft.com/office/drawing/2014/main" val="20002"/>
-                    </a:ext>
-                  </a:extLst>
-                </a:gridCol>
-                <a:gridCol w="635000">
-                  <a:extLst>
-                    <a:ext uri="{9D8B030D-6E8A-4147-A177-3AD203B41FA5}">
-                      <a16:colId xmlns:a16="http://schemas.microsoft.com/office/drawing/2014/main" val="20003"/>
-                    </a:ext>
-                  </a:extLst>
-                </a:gridCol>
+                <a:gridCol w="635000"/>
+                <a:gridCol w="635000"/>
+                <a:gridCol w="635000"/>
+                <a:gridCol w="635000"/>
               </a:tblGrid>
               <a:tr h="635000">
                 <a:tc>
                   <a:txBody>
                     <a:bodyPr/>
                     <a:lstStyle/>
-                    <a:p>
-                      <a:endParaRPr dirty="0"/>
-                    </a:p>
+                    <a:p/>
                   </a:txBody>
                   <a:tcPr>
                     <a:lnL>
@@ -3011,9 +2979,7 @@
                   <a:txBody>
                     <a:bodyPr/>
                     <a:lstStyle/>
-                    <a:p>
-                      <a:endParaRPr dirty="0"/>
-                    </a:p>
+                    <a:p/>
                   </a:txBody>
                   <a:tcPr>
                     <a:lnL>
@@ -3034,9 +3000,7 @@
                   <a:txBody>
                     <a:bodyPr/>
                     <a:lstStyle/>
-                    <a:p>
-                      <a:endParaRPr dirty="0"/>
-                    </a:p>
+                    <a:p/>
                   </a:txBody>
                   <a:tcPr>
                     <a:lnL>
@@ -3057,9 +3021,7 @@
                   <a:txBody>
                     <a:bodyPr/>
                     <a:lstStyle/>
-                    <a:p>
-                      <a:endParaRPr dirty="0"/>
-                    </a:p>
+                    <a:p/>
                   </a:txBody>
                   <a:tcPr>
                     <a:lnL>
@@ -3076,20 +3038,13 @@
                     </a:lnB>
                   </a:tcPr>
                 </a:tc>
-                <a:extLst>
-                  <a:ext uri="{0D108BD9-81ED-4DB2-BD59-A6C34878D82A}">
-                    <a16:rowId xmlns:a16="http://schemas.microsoft.com/office/drawing/2014/main" val="10000"/>
-                  </a:ext>
-                </a:extLst>
               </a:tr>
               <a:tr h="381000">
                 <a:tc>
                   <a:txBody>
                     <a:bodyPr/>
                     <a:lstStyle/>
-                    <a:p>
-                      <a:endParaRPr/>
-                    </a:p>
+                    <a:p/>
                   </a:txBody>
                   <a:tcPr>
                     <a:lnL>
@@ -3110,9 +3065,7 @@
                   <a:txBody>
                     <a:bodyPr/>
                     <a:lstStyle/>
-                    <a:p>
-                      <a:endParaRPr/>
-                    </a:p>
+                    <a:p/>
                   </a:txBody>
                   <a:tcPr>
                     <a:lnL>
@@ -3133,9 +3086,7 @@
                   <a:txBody>
                     <a:bodyPr/>
                     <a:lstStyle/>
-                    <a:p>
-                      <a:endParaRPr/>
-                    </a:p>
+                    <a:p/>
                   </a:txBody>
                   <a:tcPr>
                     <a:lnL>
@@ -3156,9 +3107,7 @@
                   <a:txBody>
                     <a:bodyPr/>
                     <a:lstStyle/>
-                    <a:p>
-                      <a:endParaRPr/>
-                    </a:p>
+                    <a:p/>
                   </a:txBody>
                   <a:tcPr>
                     <a:lnL>
@@ -3175,20 +3124,13 @@
                     </a:lnB>
                   </a:tcPr>
                 </a:tc>
-                <a:extLst>
-                  <a:ext uri="{0D108BD9-81ED-4DB2-BD59-A6C34878D82A}">
-                    <a16:rowId xmlns:a16="http://schemas.microsoft.com/office/drawing/2014/main" val="10001"/>
-                  </a:ext>
-                </a:extLst>
               </a:tr>
               <a:tr h="381000">
                 <a:tc>
                   <a:txBody>
                     <a:bodyPr/>
                     <a:lstStyle/>
-                    <a:p>
-                      <a:endParaRPr/>
-                    </a:p>
+                    <a:p/>
                   </a:txBody>
                   <a:tcPr>
                     <a:lnL>
@@ -3209,9 +3151,7 @@
                   <a:txBody>
                     <a:bodyPr/>
                     <a:lstStyle/>
-                    <a:p>
-                      <a:endParaRPr/>
-                    </a:p>
+                    <a:p/>
                   </a:txBody>
                   <a:tcPr>
                     <a:lnL>
@@ -3232,9 +3172,7 @@
                   <a:txBody>
                     <a:bodyPr/>
                     <a:lstStyle/>
-                    <a:p>
-                      <a:endParaRPr/>
-                    </a:p>
+                    <a:p/>
                   </a:txBody>
                   <a:tcPr>
                     <a:lnL>
@@ -3255,9 +3193,7 @@
                   <a:txBody>
                     <a:bodyPr/>
                     <a:lstStyle/>
-                    <a:p>
-                      <a:endParaRPr/>
-                    </a:p>
+                    <a:p/>
                   </a:txBody>
                   <a:tcPr>
                     <a:lnL>
@@ -3274,20 +3210,13 @@
                     </a:lnB>
                   </a:tcPr>
                 </a:tc>
-                <a:extLst>
-                  <a:ext uri="{0D108BD9-81ED-4DB2-BD59-A6C34878D82A}">
-                    <a16:rowId xmlns:a16="http://schemas.microsoft.com/office/drawing/2014/main" val="10002"/>
-                  </a:ext>
-                </a:extLst>
               </a:tr>
               <a:tr h="381000">
                 <a:tc>
                   <a:txBody>
                     <a:bodyPr/>
                     <a:lstStyle/>
-                    <a:p>
-                      <a:endParaRPr/>
-                    </a:p>
+                    <a:p/>
                   </a:txBody>
                   <a:tcPr>
                     <a:lnL>
@@ -3308,9 +3237,7 @@
                   <a:txBody>
                     <a:bodyPr/>
                     <a:lstStyle/>
-                    <a:p>
-                      <a:endParaRPr/>
-                    </a:p>
+                    <a:p/>
                   </a:txBody>
                   <a:tcPr>
                     <a:lnL>
@@ -3331,9 +3258,7 @@
                   <a:txBody>
                     <a:bodyPr/>
                     <a:lstStyle/>
-                    <a:p>
-                      <a:endParaRPr/>
-                    </a:p>
+                    <a:p/>
                   </a:txBody>
                   <a:tcPr>
                     <a:lnL>
@@ -3354,9 +3279,7 @@
                   <a:txBody>
                     <a:bodyPr/>
                     <a:lstStyle/>
-                    <a:p>
-                      <a:endParaRPr/>
-                    </a:p>
+                    <a:p/>
                   </a:txBody>
                   <a:tcPr>
                     <a:lnL>
@@ -3373,20 +3296,13 @@
                     </a:lnB>
                   </a:tcPr>
                 </a:tc>
-                <a:extLst>
-                  <a:ext uri="{0D108BD9-81ED-4DB2-BD59-A6C34878D82A}">
-                    <a16:rowId xmlns:a16="http://schemas.microsoft.com/office/drawing/2014/main" val="10003"/>
-                  </a:ext>
-                </a:extLst>
               </a:tr>
               <a:tr h="381000">
                 <a:tc>
                   <a:txBody>
                     <a:bodyPr/>
                     <a:lstStyle/>
-                    <a:p>
-                      <a:endParaRPr/>
-                    </a:p>
+                    <a:p/>
                   </a:txBody>
                   <a:tcPr>
                     <a:lnL>
@@ -3407,9 +3323,7 @@
                   <a:txBody>
                     <a:bodyPr/>
                     <a:lstStyle/>
-                    <a:p>
-                      <a:endParaRPr/>
-                    </a:p>
+                    <a:p/>
                   </a:txBody>
                   <a:tcPr>
                     <a:lnL>
@@ -3430,9 +3344,7 @@
                   <a:txBody>
                     <a:bodyPr/>
                     <a:lstStyle/>
-                    <a:p>
-                      <a:endParaRPr/>
-                    </a:p>
+                    <a:p/>
                   </a:txBody>
                   <a:tcPr>
                     <a:lnL>
@@ -3453,9 +3365,7 @@
                   <a:txBody>
                     <a:bodyPr/>
                     <a:lstStyle/>
-                    <a:p>
-                      <a:endParaRPr dirty="0"/>
-                    </a:p>
+                    <a:p/>
                   </a:txBody>
                   <a:tcPr>
                     <a:lnL>
@@ -3472,11 +3382,6 @@
                     </a:lnB>
                   </a:tcPr>
                 </a:tc>
-                <a:extLst>
-                  <a:ext uri="{0D108BD9-81ED-4DB2-BD59-A6C34878D82A}">
-                    <a16:rowId xmlns:a16="http://schemas.microsoft.com/office/drawing/2014/main" val="10004"/>
-                  </a:ext>
-                </a:extLst>
               </a:tr>
             </a:tbl>
           </a:graphicData>
@@ -3488,11 +3393,12 @@
     <a:masterClrMapping/>
   </p:clrMapOvr>
   <p:transition/>
+  <p:timing/>
 </p:sld>
 </file>
 
 <file path=ppt/tags/tag1.xml><?xml version="1.0" encoding="utf-8"?>
-<p:tagLst xmlns:a="http://schemas.openxmlformats.org/drawingml/2006/main" xmlns:r="http://schemas.openxmlformats.org/officeDocument/2006/relationships" xmlns:p="http://schemas.openxmlformats.org/presentationml/2006/main">
+<p:tagLst xmlns:p="http://schemas.openxmlformats.org/presentationml/2006/main">
   <p:tag name="AS_NET" val="4.0.30319.42000"/>
   <p:tag name="AS_OS" val="Microsoft Windows NT 6.2.9200.0"/>
   <p:tag name="AS_RELEASE_DATE" val="2019.06.14"/>
@@ -3502,7 +3408,7 @@
 </file>
 
 <file path=ppt/theme/theme1.xml><?xml version="1.0" encoding="utf-8"?>
-<a:theme xmlns:a="http://schemas.openxmlformats.org/drawingml/2006/main" name="Office Theme">
+<a:theme xmlns:r="http://schemas.openxmlformats.org/officeDocument/2006/relationships" xmlns:a="http://schemas.openxmlformats.org/drawingml/2006/main" name="Office Theme">
   <a:themeElements>
     <a:clrScheme name="Office">
       <a:dk1>
@@ -3781,7 +3687,5 @@
       </a:bgFillStyleLst>
     </a:fmtScheme>
   </a:themeElements>
-  <a:objectDefaults/>
-  <a:extraClrSchemeLst/>
 </a:theme>
 </file>
</xml_diff>